<commit_message>
update agenda and remove times
</commit_message>
<xml_diff>
--- a/presentations/1-Workshop-Kickoff.pptx
+++ b/presentations/1-Workshop-Kickoff.pptx
@@ -198,7 +198,7 @@
           <a:p>
             <a:fld id="{7B47E9F9-6557-4923-BE10-1C342566E3EE}" type="datetimeFigureOut">
               <a:rPr lang="en-US" smtClean="0"/>
-              <a:t>1/24/17</a:t>
+              <a:t>1/26/17</a:t>
             </a:fld>
             <a:endParaRPr lang="en-US"/>
           </a:p>
@@ -8365,7 +8365,6 @@
               <a:rPr lang="en-US" b="1" dirty="0" smtClean="0"/>
               <a:t>Paul Hopper</a:t>
             </a:r>
-            <a:endParaRPr lang="en-US" b="1" dirty="0" smtClean="0"/>
           </a:p>
           <a:p>
             <a:pPr lvl="1"/>
@@ -8537,8 +8536,8 @@
         </p:nvSpPr>
         <p:spPr>
           <a:xfrm>
-            <a:off x="85809" y="1055210"/>
-            <a:ext cx="8917355" cy="3551808"/>
+            <a:off x="226645" y="912650"/>
+            <a:ext cx="8917355" cy="3727030"/>
           </a:xfrm>
         </p:spPr>
         <p:txBody>
@@ -8547,291 +8546,198 @@
           </a:bodyPr>
           <a:lstStyle/>
           <a:p>
-            <a:pPr marL="0" indent="0">
-              <a:buNone/>
+            <a:pPr>
+              <a:lnSpc>
+                <a:spcPct val="150000"/>
+              </a:lnSpc>
+              <a:spcBef>
+                <a:spcPts val="0"/>
+              </a:spcBef>
             </a:pPr>
             <a:r>
-              <a:rPr lang="en-US" sz="1600" b="1" dirty="0"/>
-              <a:t>8</a:t>
-            </a:r>
-            <a:r>
-              <a:rPr lang="en-US" sz="1600" b="1" dirty="0" smtClean="0"/>
-              <a:t>:00 </a:t>
-            </a:r>
-            <a:r>
-              <a:rPr lang="en-US" sz="1600" b="1" dirty="0"/>
-              <a:t>AM </a:t>
-            </a:r>
-            <a:r>
-              <a:rPr lang="en-US" sz="1600" b="1" dirty="0" smtClean="0"/>
-              <a:t>– </a:t>
-            </a:r>
-            <a:r>
-              <a:rPr lang="en-US" sz="1600" b="1" dirty="0" smtClean="0"/>
-              <a:t>8:15 </a:t>
-            </a:r>
-            <a:r>
-              <a:rPr lang="en-US" sz="1600" b="1" dirty="0"/>
-              <a:t>AM		</a:t>
-            </a:r>
-            <a:r>
-              <a:rPr lang="en-US" sz="1600" b="1" dirty="0" smtClean="0"/>
+              <a:rPr lang="en-US" sz="1800" b="1" dirty="0" smtClean="0"/>
               <a:t>Introduction</a:t>
             </a:r>
-            <a:endParaRPr lang="en-US" sz="1600" b="1" dirty="0"/>
-          </a:p>
-          <a:p>
-            <a:pPr marL="0" indent="0">
-              <a:buNone/>
+            <a:endParaRPr lang="en-US" sz="1800" b="1" dirty="0"/>
+          </a:p>
+          <a:p>
+            <a:pPr>
+              <a:lnSpc>
+                <a:spcPct val="150000"/>
+              </a:lnSpc>
+              <a:spcBef>
+                <a:spcPts val="0"/>
+              </a:spcBef>
             </a:pPr>
             <a:r>
-              <a:rPr lang="en-US" sz="1600" b="1" dirty="0" smtClean="0"/>
-              <a:t>8:15 </a:t>
-            </a:r>
-            <a:r>
-              <a:rPr lang="en-US" sz="1600" b="1" dirty="0"/>
-              <a:t>AM </a:t>
-            </a:r>
-            <a:r>
-              <a:rPr lang="en-US" sz="1600" b="1" dirty="0" smtClean="0"/>
-              <a:t>– </a:t>
-            </a:r>
-            <a:r>
-              <a:rPr lang="en-US" sz="1600" b="1" dirty="0" smtClean="0"/>
-              <a:t>8:45AM</a:t>
-            </a:r>
-            <a:r>
-              <a:rPr lang="en-US" sz="1600" b="1" dirty="0"/>
-              <a:t>	</a:t>
-            </a:r>
-            <a:r>
-              <a:rPr lang="en-US" sz="1600" b="1" dirty="0" smtClean="0"/>
-              <a:t>	</a:t>
-            </a:r>
-            <a:r>
-              <a:rPr lang="en-US" sz="1600" b="1" dirty="0"/>
-              <a:t>Cloud Native Introduction</a:t>
-            </a:r>
-          </a:p>
-          <a:p>
-            <a:pPr marL="0" indent="0">
-              <a:buNone/>
+              <a:rPr lang="en-US" sz="1800" b="1" dirty="0" smtClean="0"/>
+              <a:t>Cloud </a:t>
+            </a:r>
+            <a:r>
+              <a:rPr lang="en-US" sz="1800" b="1" dirty="0"/>
+              <a:t>Native </a:t>
+            </a:r>
+            <a:r>
+              <a:rPr lang="en-US" sz="1800" b="1" dirty="0" smtClean="0"/>
+              <a:t>Introduction - </a:t>
+            </a:r>
+            <a:r>
+              <a:rPr lang="en-US" sz="1800" i="1" dirty="0" smtClean="0"/>
+              <a:t>Industry </a:t>
+            </a:r>
+            <a:r>
+              <a:rPr lang="en-US" sz="1800" i="1" dirty="0"/>
+              <a:t>Trends and Overview including: 12 Factor Apps, </a:t>
+            </a:r>
+            <a:r>
+              <a:rPr lang="en-US" sz="1800" i="1" dirty="0" err="1" smtClean="0"/>
+              <a:t>DevOps</a:t>
+            </a:r>
+            <a:r>
+              <a:rPr lang="en-US" sz="1800" i="1" dirty="0"/>
+              <a:t>, </a:t>
+            </a:r>
+            <a:r>
+              <a:rPr lang="en-US" sz="1800" i="1" dirty="0" smtClean="0"/>
+              <a:t>Microservices and Cloud </a:t>
+            </a:r>
+            <a:r>
+              <a:rPr lang="en-US" sz="1800" i="1" dirty="0"/>
+              <a:t>Platforms</a:t>
+            </a:r>
+          </a:p>
+          <a:p>
+            <a:pPr>
+              <a:lnSpc>
+                <a:spcPct val="150000"/>
+              </a:lnSpc>
+              <a:spcBef>
+                <a:spcPts val="0"/>
+              </a:spcBef>
             </a:pPr>
             <a:r>
-              <a:rPr lang="en-US" sz="1600" dirty="0"/>
-              <a:t>						Industry Trends and Overview including: 12 Factor Apps, 						</a:t>
-            </a:r>
-            <a:r>
-              <a:rPr lang="en-US" sz="1600" dirty="0" err="1"/>
-              <a:t>DevOps</a:t>
-            </a:r>
-            <a:r>
-              <a:rPr lang="en-US" sz="1600" dirty="0"/>
-              <a:t>, Microservices and Cloud Platforms</a:t>
-            </a:r>
-          </a:p>
-          <a:p>
-            <a:pPr marL="0" indent="0">
-              <a:buNone/>
+              <a:rPr lang="en-US" sz="1800" b="1" dirty="0" smtClean="0"/>
+              <a:t>Cloud </a:t>
+            </a:r>
+            <a:r>
+              <a:rPr lang="en-US" sz="1800" b="1" dirty="0" smtClean="0"/>
+              <a:t>Native </a:t>
+            </a:r>
+            <a:r>
+              <a:rPr lang="en-US" sz="1800" b="1" dirty="0" smtClean="0"/>
+              <a:t>Platform - </a:t>
+            </a:r>
+            <a:r>
+              <a:rPr lang="en-US" sz="1800" i="1" dirty="0" smtClean="0"/>
+              <a:t>An </a:t>
+            </a:r>
+            <a:r>
+              <a:rPr lang="en-US" sz="1800" i="1" dirty="0"/>
+              <a:t>overview of </a:t>
+            </a:r>
+            <a:r>
+              <a:rPr lang="en-US" sz="1800" i="1" dirty="0" smtClean="0"/>
+              <a:t>Cloud Foundry (PCF) and </a:t>
+            </a:r>
+            <a:r>
+              <a:rPr lang="en-US" sz="1800" i="1" dirty="0"/>
+              <a:t>its </a:t>
+            </a:r>
+            <a:r>
+              <a:rPr lang="en-US" sz="1800" i="1" dirty="0" smtClean="0"/>
+              <a:t>Architecture</a:t>
+            </a:r>
+          </a:p>
+          <a:p>
+            <a:pPr>
+              <a:lnSpc>
+                <a:spcPct val="150000"/>
+              </a:lnSpc>
+              <a:spcBef>
+                <a:spcPts val="0"/>
+              </a:spcBef>
             </a:pPr>
             <a:r>
-              <a:rPr lang="en-US" sz="1600" b="1" dirty="0" smtClean="0"/>
-              <a:t>8:45AM </a:t>
-            </a:r>
-            <a:r>
-              <a:rPr lang="en-US" sz="1600" b="1" dirty="0" smtClean="0"/>
-              <a:t>– </a:t>
-            </a:r>
-            <a:r>
-              <a:rPr lang="en-US" sz="1600" b="1" dirty="0" smtClean="0"/>
-              <a:t>9:15 </a:t>
-            </a:r>
-            <a:r>
-              <a:rPr lang="en-US" sz="1600" b="1" dirty="0"/>
-              <a:t>AM	</a:t>
-            </a:r>
-            <a:r>
-              <a:rPr lang="en-US" sz="1600" b="1" dirty="0" smtClean="0"/>
-              <a:t>	Cloud </a:t>
-            </a:r>
-            <a:r>
-              <a:rPr lang="en-US" sz="1600" b="1" dirty="0" smtClean="0"/>
-              <a:t>Native Platform</a:t>
-            </a:r>
-            <a:endParaRPr lang="en-US" sz="1600" b="1" dirty="0"/>
-          </a:p>
-          <a:p>
-            <a:pPr marL="0" indent="0">
-              <a:buNone/>
+              <a:rPr lang="en-US" sz="1800" dirty="0" smtClean="0"/>
+              <a:t>Break (around 10 AM)</a:t>
+            </a:r>
+            <a:endParaRPr lang="en-US" sz="1800" dirty="0"/>
+          </a:p>
+          <a:p>
+            <a:pPr>
+              <a:lnSpc>
+                <a:spcPct val="150000"/>
+              </a:lnSpc>
+              <a:spcBef>
+                <a:spcPts val="0"/>
+              </a:spcBef>
             </a:pPr>
             <a:r>
-              <a:rPr lang="en-US" sz="1600" dirty="0"/>
-              <a:t>				</a:t>
-            </a:r>
-            <a:r>
-              <a:rPr lang="en-US" sz="1600" dirty="0" smtClean="0"/>
-              <a:t>		An </a:t>
-            </a:r>
-            <a:r>
-              <a:rPr lang="en-US" sz="1600" dirty="0"/>
-              <a:t>overview of </a:t>
-            </a:r>
-            <a:r>
-              <a:rPr lang="en-US" sz="1600" dirty="0" smtClean="0"/>
-              <a:t>Cloud Foundry (PCF) and </a:t>
-            </a:r>
-            <a:r>
-              <a:rPr lang="en-US" sz="1600" dirty="0"/>
-              <a:t>its Architecture</a:t>
-            </a:r>
-          </a:p>
-          <a:p>
-            <a:pPr marL="0" indent="0">
-              <a:buNone/>
+              <a:rPr lang="en-US" sz="1800" b="1" dirty="0" smtClean="0"/>
+              <a:t>Services </a:t>
+            </a:r>
+            <a:r>
+              <a:rPr lang="en-US" sz="1800" b="1" dirty="0"/>
+              <a:t>Made </a:t>
+            </a:r>
+            <a:r>
+              <a:rPr lang="en-US" sz="1800" b="1" dirty="0" smtClean="0"/>
+              <a:t>Easy - </a:t>
+            </a:r>
+            <a:r>
+              <a:rPr lang="en-US" sz="1800" i="1" dirty="0" smtClean="0"/>
+              <a:t>PCF </a:t>
+            </a:r>
+            <a:r>
+              <a:rPr lang="en-US" sz="1800" i="1" dirty="0"/>
+              <a:t>Services (Database, Messaging, etc.) and the </a:t>
+            </a:r>
+            <a:r>
+              <a:rPr lang="en-US" sz="1800" i="1" dirty="0" smtClean="0"/>
+              <a:t>Marketplace</a:t>
+            </a:r>
+          </a:p>
+          <a:p>
+            <a:pPr>
+              <a:lnSpc>
+                <a:spcPct val="150000"/>
+              </a:lnSpc>
+              <a:spcBef>
+                <a:spcPts val="0"/>
+              </a:spcBef>
             </a:pPr>
             <a:r>
-              <a:rPr lang="en-US" sz="1600" b="1" dirty="0" smtClean="0"/>
-              <a:t>9:15AM </a:t>
-            </a:r>
-            <a:r>
-              <a:rPr lang="mr-IN" sz="1600" b="1" dirty="0" smtClean="0"/>
-              <a:t>–</a:t>
-            </a:r>
-            <a:r>
-              <a:rPr lang="en-US" sz="1600" b="1" dirty="0" smtClean="0"/>
-              <a:t> 9:45 AM</a:t>
-            </a:r>
-            <a:r>
-              <a:rPr lang="en-US" sz="1600" b="1" dirty="0"/>
-              <a:t>	</a:t>
-            </a:r>
-            <a:r>
-              <a:rPr lang="en-US" sz="1600" b="1" dirty="0" smtClean="0"/>
-              <a:t>	Services </a:t>
-            </a:r>
-            <a:r>
-              <a:rPr lang="en-US" sz="1600" b="1" dirty="0"/>
-              <a:t>Made Easy</a:t>
-            </a:r>
-          </a:p>
-          <a:p>
-            <a:pPr marL="0" indent="0">
-              <a:buNone/>
+              <a:rPr lang="en-US" sz="1800" b="1" dirty="0" smtClean="0"/>
+              <a:t>Developer Workshop - </a:t>
+            </a:r>
+            <a:r>
+              <a:rPr lang="en-US" sz="1800" i="1" dirty="0" smtClean="0"/>
+              <a:t>Hands</a:t>
+            </a:r>
+            <a:r>
+              <a:rPr lang="en-US" sz="1800" i="1" dirty="0"/>
+              <a:t>-on pushing code with PCF</a:t>
+            </a:r>
+          </a:p>
+          <a:p>
+            <a:pPr>
+              <a:lnSpc>
+                <a:spcPct val="150000"/>
+              </a:lnSpc>
+              <a:spcBef>
+                <a:spcPts val="0"/>
+              </a:spcBef>
             </a:pPr>
             <a:r>
-              <a:rPr lang="en-US" sz="1600" dirty="0"/>
-              <a:t>				</a:t>
-            </a:r>
-            <a:r>
-              <a:rPr lang="en-US" sz="1600" dirty="0" smtClean="0"/>
-              <a:t>		PCF </a:t>
-            </a:r>
-            <a:r>
-              <a:rPr lang="en-US" sz="1600" dirty="0"/>
-              <a:t>Services (Database, Messaging, etc.) and the </a:t>
-            </a:r>
-            <a:r>
-              <a:rPr lang="en-US" sz="1600" dirty="0" smtClean="0"/>
-              <a:t>Marketplace</a:t>
-            </a:r>
-          </a:p>
-          <a:p>
-            <a:pPr marL="0" indent="0">
-              <a:buNone/>
-            </a:pPr>
-            <a:r>
-              <a:rPr lang="en-US" sz="1600" b="1" dirty="0" smtClean="0"/>
-              <a:t>9:45 </a:t>
-            </a:r>
-            <a:r>
-              <a:rPr lang="en-US" sz="1600" b="1" dirty="0"/>
-              <a:t>PM – </a:t>
-            </a:r>
-            <a:r>
-              <a:rPr lang="en-US" sz="1600" b="1" dirty="0" smtClean="0"/>
-              <a:t>10:00 AM</a:t>
-            </a:r>
-            <a:r>
-              <a:rPr lang="en-US" sz="1600" b="1" dirty="0"/>
-              <a:t>	</a:t>
-            </a:r>
-            <a:r>
-              <a:rPr lang="en-US" sz="1600" b="1" dirty="0" smtClean="0"/>
-              <a:t>Break</a:t>
-            </a:r>
-            <a:endParaRPr lang="en-US" sz="1600" b="1" dirty="0"/>
-          </a:p>
-          <a:p>
-            <a:pPr marL="0" indent="0">
-              <a:buNone/>
-            </a:pPr>
-            <a:r>
-              <a:rPr lang="en-US" sz="1600" b="1" dirty="0" smtClean="0"/>
-              <a:t>10:00 </a:t>
-            </a:r>
-            <a:r>
-              <a:rPr lang="en-US" sz="1600" b="1" dirty="0"/>
-              <a:t>PM – </a:t>
-            </a:r>
-            <a:r>
-              <a:rPr lang="en-US" sz="1600" b="1" dirty="0" smtClean="0"/>
-              <a:t>11:45 </a:t>
-            </a:r>
-            <a:r>
-              <a:rPr lang="en-US" sz="1600" b="1" dirty="0"/>
-              <a:t>PM	</a:t>
-            </a:r>
-            <a:r>
-              <a:rPr lang="en-US" sz="1600" b="1" dirty="0" smtClean="0"/>
-              <a:t>Developer </a:t>
-            </a:r>
-            <a:r>
-              <a:rPr lang="en-US" sz="1600" b="1" dirty="0"/>
-              <a:t>Workshop</a:t>
-            </a:r>
-          </a:p>
-          <a:p>
-            <a:pPr marL="0" indent="0">
-              <a:buNone/>
-            </a:pPr>
-            <a:r>
-              <a:rPr lang="en-US" sz="1600" dirty="0"/>
-              <a:t>						Hands-on pushing code with PCF</a:t>
-            </a:r>
-          </a:p>
-          <a:p>
-            <a:pPr marL="0" indent="0">
-              <a:buNone/>
-            </a:pPr>
-            <a:r>
-              <a:rPr lang="en-US" sz="1600" b="1" dirty="0" smtClean="0"/>
-              <a:t>11:45 </a:t>
-            </a:r>
-            <a:r>
-              <a:rPr lang="en-US" sz="1600" b="1" dirty="0"/>
-              <a:t>PM - </a:t>
-            </a:r>
-            <a:r>
-              <a:rPr lang="en-US" sz="1600" b="1" dirty="0" smtClean="0"/>
-              <a:t>12:</a:t>
-            </a:r>
-            <a:r>
-              <a:rPr lang="en-US" sz="1600" b="1" dirty="0"/>
-              <a:t>00 PM	</a:t>
-            </a:r>
-            <a:r>
-              <a:rPr lang="en-US" sz="1600" b="1" dirty="0" smtClean="0"/>
+              <a:rPr lang="en-US" sz="1800" b="1" dirty="0" smtClean="0"/>
               <a:t>Wrap </a:t>
             </a:r>
             <a:r>
-              <a:rPr lang="en-US" sz="1600" b="1" dirty="0"/>
+              <a:rPr lang="en-US" sz="1800" b="1" dirty="0"/>
               <a:t>Up, Q/A, &amp; Feedback</a:t>
             </a:r>
           </a:p>
           <a:p>
-            <a:pPr marL="0" indent="0">
-              <a:buNone/>
-            </a:pPr>
             <a:endParaRPr lang="en-US" sz="1600" dirty="0"/>
           </a:p>
         </p:txBody>

</xml_diff>